<commit_message>
Some test cases are done
</commit_message>
<xml_diff>
--- a/Design/Medino Pharmacy.pptx
+++ b/Design/Medino Pharmacy.pptx
@@ -33,18 +33,19 @@
     <p:sldId id="290" r:id="rId27"/>
     <p:sldId id="312" r:id="rId28"/>
     <p:sldId id="295" r:id="rId29"/>
-    <p:sldId id="299" r:id="rId30"/>
-    <p:sldId id="300" r:id="rId31"/>
-    <p:sldId id="301" r:id="rId32"/>
-    <p:sldId id="302" r:id="rId33"/>
-    <p:sldId id="303" r:id="rId34"/>
-    <p:sldId id="304" r:id="rId35"/>
-    <p:sldId id="305" r:id="rId36"/>
-    <p:sldId id="306" r:id="rId37"/>
-    <p:sldId id="307" r:id="rId38"/>
-    <p:sldId id="308" r:id="rId39"/>
-    <p:sldId id="310" r:id="rId40"/>
-    <p:sldId id="309" r:id="rId41"/>
+    <p:sldId id="313" r:id="rId30"/>
+    <p:sldId id="299" r:id="rId31"/>
+    <p:sldId id="300" r:id="rId32"/>
+    <p:sldId id="301" r:id="rId33"/>
+    <p:sldId id="302" r:id="rId34"/>
+    <p:sldId id="303" r:id="rId35"/>
+    <p:sldId id="304" r:id="rId36"/>
+    <p:sldId id="305" r:id="rId37"/>
+    <p:sldId id="306" r:id="rId38"/>
+    <p:sldId id="307" r:id="rId39"/>
+    <p:sldId id="308" r:id="rId40"/>
+    <p:sldId id="310" r:id="rId41"/>
+    <p:sldId id="309" r:id="rId42"/>
   </p:sldIdLst>
   <p:sldSz cx="12192000" cy="6858000"/>
   <p:notesSz cx="6858000" cy="9144000"/>
@@ -298,7 +299,7 @@
           <a:p>
             <a:fld id="{48A87A34-81AB-432B-8DAE-1953F412C126}" type="datetimeFigureOut">
               <a:rPr lang="en-US" smtClean="0"/>
-              <a:t>4/2/2019</a:t>
+              <a:t>4/3/2019</a:t>
             </a:fld>
             <a:endParaRPr lang="en-US" dirty="0"/>
           </a:p>
@@ -496,7 +497,7 @@
           <a:p>
             <a:fld id="{48A87A34-81AB-432B-8DAE-1953F412C126}" type="datetimeFigureOut">
               <a:rPr lang="en-US" smtClean="0"/>
-              <a:t>4/2/2019</a:t>
+              <a:t>4/3/2019</a:t>
             </a:fld>
             <a:endParaRPr lang="en-US" dirty="0"/>
           </a:p>
@@ -704,7 +705,7 @@
           <a:p>
             <a:fld id="{48A87A34-81AB-432B-8DAE-1953F412C126}" type="datetimeFigureOut">
               <a:rPr lang="en-US" smtClean="0"/>
-              <a:t>4/2/2019</a:t>
+              <a:t>4/3/2019</a:t>
             </a:fld>
             <a:endParaRPr lang="en-US" dirty="0"/>
           </a:p>
@@ -902,7 +903,7 @@
           <a:p>
             <a:fld id="{48A87A34-81AB-432B-8DAE-1953F412C126}" type="datetimeFigureOut">
               <a:rPr lang="en-US" smtClean="0"/>
-              <a:t>4/2/2019</a:t>
+              <a:t>4/3/2019</a:t>
             </a:fld>
             <a:endParaRPr lang="en-US" dirty="0"/>
           </a:p>
@@ -1177,7 +1178,7 @@
           <a:p>
             <a:fld id="{48A87A34-81AB-432B-8DAE-1953F412C126}" type="datetimeFigureOut">
               <a:rPr lang="en-US" smtClean="0"/>
-              <a:t>4/2/2019</a:t>
+              <a:t>4/3/2019</a:t>
             </a:fld>
             <a:endParaRPr lang="en-US" dirty="0"/>
           </a:p>
@@ -1442,7 +1443,7 @@
           <a:p>
             <a:fld id="{48A87A34-81AB-432B-8DAE-1953F412C126}" type="datetimeFigureOut">
               <a:rPr lang="en-US" smtClean="0"/>
-              <a:t>4/2/2019</a:t>
+              <a:t>4/3/2019</a:t>
             </a:fld>
             <a:endParaRPr lang="en-US" dirty="0"/>
           </a:p>
@@ -1854,7 +1855,7 @@
           <a:p>
             <a:fld id="{48A87A34-81AB-432B-8DAE-1953F412C126}" type="datetimeFigureOut">
               <a:rPr lang="en-US" smtClean="0"/>
-              <a:t>4/2/2019</a:t>
+              <a:t>4/3/2019</a:t>
             </a:fld>
             <a:endParaRPr lang="en-US" dirty="0"/>
           </a:p>
@@ -1995,7 +1996,7 @@
           <a:p>
             <a:fld id="{48A87A34-81AB-432B-8DAE-1953F412C126}" type="datetimeFigureOut">
               <a:rPr lang="en-US" smtClean="0"/>
-              <a:t>4/2/2019</a:t>
+              <a:t>4/3/2019</a:t>
             </a:fld>
             <a:endParaRPr lang="en-US" dirty="0"/>
           </a:p>
@@ -2108,7 +2109,7 @@
           <a:p>
             <a:fld id="{48A87A34-81AB-432B-8DAE-1953F412C126}" type="datetimeFigureOut">
               <a:rPr lang="en-US" smtClean="0"/>
-              <a:t>4/2/2019</a:t>
+              <a:t>4/3/2019</a:t>
             </a:fld>
             <a:endParaRPr lang="en-US" dirty="0"/>
           </a:p>
@@ -2419,7 +2420,7 @@
           <a:p>
             <a:fld id="{48A87A34-81AB-432B-8DAE-1953F412C126}" type="datetimeFigureOut">
               <a:rPr lang="en-US" smtClean="0"/>
-              <a:t>4/2/2019</a:t>
+              <a:t>4/3/2019</a:t>
             </a:fld>
             <a:endParaRPr lang="en-US" dirty="0"/>
           </a:p>
@@ -2707,7 +2708,7 @@
           <a:p>
             <a:fld id="{48A87A34-81AB-432B-8DAE-1953F412C126}" type="datetimeFigureOut">
               <a:rPr lang="en-US" smtClean="0"/>
-              <a:t>4/2/2019</a:t>
+              <a:t>4/3/2019</a:t>
             </a:fld>
             <a:endParaRPr lang="en-US" dirty="0"/>
           </a:p>
@@ -2949,7 +2950,7 @@
             <a:fld id="{48A87A34-81AB-432B-8DAE-1953F412C126}" type="datetimeFigureOut">
               <a:rPr lang="en-US" smtClean="0"/>
               <a:pPr/>
-              <a:t>4/2/2019</a:t>
+              <a:t>4/3/2019</a:t>
             </a:fld>
             <a:endParaRPr lang="en-US" dirty="0"/>
           </a:p>
@@ -5832,73 +5833,40 @@
           <a:chExt cx="0" cy="0"/>
         </a:xfrm>
       </p:grpSpPr>
-      <p:sp>
-        <p:nvSpPr>
-          <p:cNvPr id="2" name="Title 1">
-            <a:extLst>
-              <a:ext uri="{FF2B5EF4-FFF2-40B4-BE49-F238E27FC236}">
-                <a16:creationId xmlns:a16="http://schemas.microsoft.com/office/drawing/2014/main" id="{D641C548-0BA5-4765-9B72-9AC871843DDF}"/>
-              </a:ext>
-            </a:extLst>
-          </p:cNvPr>
-          <p:cNvSpPr>
-            <a:spLocks noGrp="1"/>
-          </p:cNvSpPr>
-          <p:nvPr>
-            <p:ph type="title"/>
-          </p:nvPr>
-        </p:nvSpPr>
-        <p:spPr>
-          <a:xfrm>
-            <a:off x="1141412" y="400050"/>
-            <a:ext cx="9905998" cy="1049338"/>
-          </a:xfrm>
-        </p:spPr>
-        <p:txBody>
-          <a:bodyPr/>
-          <a:lstStyle/>
-          <a:p>
-            <a:r>
-              <a:rPr lang="en-US" dirty="0"/>
-              <a:t>Coding and its UI design</a:t>
-            </a:r>
-          </a:p>
-        </p:txBody>
-      </p:sp>
-      <p:sp>
-        <p:nvSpPr>
-          <p:cNvPr id="3" name="Content Placeholder 2">
-            <a:extLst>
-              <a:ext uri="{FF2B5EF4-FFF2-40B4-BE49-F238E27FC236}">
-                <a16:creationId xmlns:a16="http://schemas.microsoft.com/office/drawing/2014/main" id="{AE5B442C-9717-4DA6-93BC-F7C288E743BB}"/>
-              </a:ext>
-            </a:extLst>
-          </p:cNvPr>
-          <p:cNvSpPr>
-            <a:spLocks noGrp="1"/>
-          </p:cNvSpPr>
-          <p:nvPr>
-            <p:ph idx="1"/>
-          </p:nvPr>
-        </p:nvSpPr>
-        <p:spPr>
-          <a:xfrm>
-            <a:off x="1143000" y="1658143"/>
-            <a:ext cx="9905999" cy="3541714"/>
-          </a:xfrm>
-        </p:spPr>
-        <p:txBody>
-          <a:bodyPr/>
-          <a:lstStyle/>
-          <a:p>
-            <a:endParaRPr lang="en-US" dirty="0"/>
-          </a:p>
-        </p:txBody>
-      </p:sp>
+      <p:pic>
+        <p:nvPicPr>
+          <p:cNvPr id="3" name="Picture 2">
+            <a:extLst>
+              <a:ext uri="{FF2B5EF4-FFF2-40B4-BE49-F238E27FC236}">
+                <a16:creationId xmlns:a16="http://schemas.microsoft.com/office/drawing/2014/main" id="{63D03622-A8A8-4F5C-B90A-2C2D48DB0221}"/>
+              </a:ext>
+            </a:extLst>
+          </p:cNvPr>
+          <p:cNvPicPr>
+            <a:picLocks noChangeAspect="1"/>
+          </p:cNvPicPr>
+          <p:nvPr/>
+        </p:nvPicPr>
+        <p:blipFill>
+          <a:blip r:embed="rId2"/>
+          <a:stretch>
+            <a:fillRect/>
+          </a:stretch>
+        </p:blipFill>
+        <p:spPr>
+          <a:xfrm>
+            <a:off x="0" y="409639"/>
+            <a:ext cx="12192000" cy="6038722"/>
+          </a:xfrm>
+          <a:prstGeom prst="rect">
+            <a:avLst/>
+          </a:prstGeom>
+        </p:spPr>
+      </p:pic>
     </p:spTree>
     <p:extLst>
       <p:ext uri="{BB962C8B-B14F-4D97-AF65-F5344CB8AC3E}">
-        <p14:creationId xmlns:p14="http://schemas.microsoft.com/office/powerpoint/2010/main" val="1938924297"/>
+        <p14:creationId xmlns:p14="http://schemas.microsoft.com/office/powerpoint/2010/main" val="337965065"/>
       </p:ext>
     </p:extLst>
   </p:cSld>
@@ -6096,6 +6064,158 @@
           <a:chExt cx="0" cy="0"/>
         </a:xfrm>
       </p:grpSpPr>
+      <p:sp>
+        <p:nvSpPr>
+          <p:cNvPr id="2" name="Title 1">
+            <a:extLst>
+              <a:ext uri="{FF2B5EF4-FFF2-40B4-BE49-F238E27FC236}">
+                <a16:creationId xmlns:a16="http://schemas.microsoft.com/office/drawing/2014/main" id="{D641C548-0BA5-4765-9B72-9AC871843DDF}"/>
+              </a:ext>
+            </a:extLst>
+          </p:cNvPr>
+          <p:cNvSpPr>
+            <a:spLocks noGrp="1"/>
+          </p:cNvSpPr>
+          <p:nvPr>
+            <p:ph type="title"/>
+          </p:nvPr>
+        </p:nvSpPr>
+        <p:spPr>
+          <a:xfrm>
+            <a:off x="1141412" y="400050"/>
+            <a:ext cx="9905998" cy="1049338"/>
+          </a:xfrm>
+        </p:spPr>
+        <p:txBody>
+          <a:bodyPr/>
+          <a:lstStyle/>
+          <a:p>
+            <a:r>
+              <a:rPr lang="en-US" dirty="0"/>
+              <a:t>Coding and its UI design</a:t>
+            </a:r>
+          </a:p>
+        </p:txBody>
+      </p:sp>
+      <p:pic>
+        <p:nvPicPr>
+          <p:cNvPr id="5" name="Content Placeholder 4">
+            <a:extLst>
+              <a:ext uri="{FF2B5EF4-FFF2-40B4-BE49-F238E27FC236}">
+                <a16:creationId xmlns:a16="http://schemas.microsoft.com/office/drawing/2014/main" id="{889DDFB9-CB5C-4A1C-91DC-761253E909D9}"/>
+              </a:ext>
+            </a:extLst>
+          </p:cNvPr>
+          <p:cNvPicPr>
+            <a:picLocks noGrp="1" noChangeAspect="1"/>
+          </p:cNvPicPr>
+          <p:nvPr>
+            <p:ph idx="1"/>
+          </p:nvPr>
+        </p:nvPicPr>
+        <p:blipFill>
+          <a:blip r:embed="rId2"/>
+          <a:stretch>
+            <a:fillRect/>
+          </a:stretch>
+        </p:blipFill>
+        <p:spPr>
+          <a:xfrm>
+            <a:off x="2562225" y="1868487"/>
+            <a:ext cx="5334000" cy="3341687"/>
+          </a:xfrm>
+        </p:spPr>
+      </p:pic>
+    </p:spTree>
+    <p:extLst>
+      <p:ext uri="{BB962C8B-B14F-4D97-AF65-F5344CB8AC3E}">
+        <p14:creationId xmlns:p14="http://schemas.microsoft.com/office/powerpoint/2010/main" val="1938924297"/>
+      </p:ext>
+    </p:extLst>
+  </p:cSld>
+  <p:clrMapOvr>
+    <a:masterClrMapping/>
+  </p:clrMapOvr>
+</p:sld>
+</file>
+
+<file path=ppt/slides/slide31.xml><?xml version="1.0" encoding="utf-8"?>
+<p:sld xmlns:a="http://schemas.openxmlformats.org/drawingml/2006/main" xmlns:r="http://schemas.openxmlformats.org/officeDocument/2006/relationships" xmlns:p="http://schemas.openxmlformats.org/presentationml/2006/main">
+  <p:cSld>
+    <p:spTree>
+      <p:nvGrpSpPr>
+        <p:cNvPr id="1" name=""/>
+        <p:cNvGrpSpPr/>
+        <p:nvPr/>
+      </p:nvGrpSpPr>
+      <p:grpSpPr>
+        <a:xfrm>
+          <a:off x="0" y="0"/>
+          <a:ext cx="0" cy="0"/>
+          <a:chOff x="0" y="0"/>
+          <a:chExt cx="0" cy="0"/>
+        </a:xfrm>
+      </p:grpSpPr>
+      <p:pic>
+        <p:nvPicPr>
+          <p:cNvPr id="3" name="Picture 2">
+            <a:extLst>
+              <a:ext uri="{FF2B5EF4-FFF2-40B4-BE49-F238E27FC236}">
+                <a16:creationId xmlns:a16="http://schemas.microsoft.com/office/drawing/2014/main" id="{5FD223EB-30A1-4C7D-BCC9-147DC493F94E}"/>
+              </a:ext>
+            </a:extLst>
+          </p:cNvPr>
+          <p:cNvPicPr>
+            <a:picLocks noChangeAspect="1"/>
+          </p:cNvPicPr>
+          <p:nvPr/>
+        </p:nvPicPr>
+        <p:blipFill>
+          <a:blip r:embed="rId2"/>
+          <a:stretch>
+            <a:fillRect/>
+          </a:stretch>
+        </p:blipFill>
+        <p:spPr>
+          <a:xfrm>
+            <a:off x="225425" y="412750"/>
+            <a:ext cx="4768850" cy="4902200"/>
+          </a:xfrm>
+          <a:prstGeom prst="rect">
+            <a:avLst/>
+          </a:prstGeom>
+        </p:spPr>
+      </p:pic>
+      <p:pic>
+        <p:nvPicPr>
+          <p:cNvPr id="5" name="Picture 4">
+            <a:extLst>
+              <a:ext uri="{FF2B5EF4-FFF2-40B4-BE49-F238E27FC236}">
+                <a16:creationId xmlns:a16="http://schemas.microsoft.com/office/drawing/2014/main" id="{2E506E45-331A-4A6D-BD33-40615A3416F9}"/>
+              </a:ext>
+            </a:extLst>
+          </p:cNvPr>
+          <p:cNvPicPr>
+            <a:picLocks noChangeAspect="1"/>
+          </p:cNvPicPr>
+          <p:nvPr/>
+        </p:nvPicPr>
+        <p:blipFill>
+          <a:blip r:embed="rId3"/>
+          <a:stretch>
+            <a:fillRect/>
+          </a:stretch>
+        </p:blipFill>
+        <p:spPr>
+          <a:xfrm>
+            <a:off x="5013324" y="412750"/>
+            <a:ext cx="6702425" cy="5892800"/>
+          </a:xfrm>
+          <a:prstGeom prst="rect">
+            <a:avLst/>
+          </a:prstGeom>
+        </p:spPr>
+      </p:pic>
     </p:spTree>
     <p:extLst>
       <p:ext uri="{BB962C8B-B14F-4D97-AF65-F5344CB8AC3E}">
@@ -6109,7 +6229,7 @@
 </p:sld>
 </file>
 
-<file path=ppt/slides/slide31.xml><?xml version="1.0" encoding="utf-8"?>
+<file path=ppt/slides/slide32.xml><?xml version="1.0" encoding="utf-8"?>
 <p:sld xmlns:a="http://schemas.openxmlformats.org/drawingml/2006/main" xmlns:r="http://schemas.openxmlformats.org/officeDocument/2006/relationships" xmlns:p="http://schemas.openxmlformats.org/presentationml/2006/main">
   <p:cSld>
     <p:spTree>
@@ -6139,7 +6259,7 @@
 </p:sld>
 </file>
 
-<file path=ppt/slides/slide32.xml><?xml version="1.0" encoding="utf-8"?>
+<file path=ppt/slides/slide33.xml><?xml version="1.0" encoding="utf-8"?>
 <p:sld xmlns:a="http://schemas.openxmlformats.org/drawingml/2006/main" xmlns:r="http://schemas.openxmlformats.org/officeDocument/2006/relationships" xmlns:p="http://schemas.openxmlformats.org/presentationml/2006/main">
   <p:cSld>
     <p:spTree>
@@ -6169,105 +6289,6 @@
 </p:sld>
 </file>
 
-<file path=ppt/slides/slide33.xml><?xml version="1.0" encoding="utf-8"?>
-<p:sld xmlns:a="http://schemas.openxmlformats.org/drawingml/2006/main" xmlns:r="http://schemas.openxmlformats.org/officeDocument/2006/relationships" xmlns:p="http://schemas.openxmlformats.org/presentationml/2006/main">
-  <p:cSld>
-    <p:spTree>
-      <p:nvGrpSpPr>
-        <p:cNvPr id="1" name=""/>
-        <p:cNvGrpSpPr/>
-        <p:nvPr/>
-      </p:nvGrpSpPr>
-      <p:grpSpPr>
-        <a:xfrm>
-          <a:off x="0" y="0"/>
-          <a:ext cx="0" cy="0"/>
-          <a:chOff x="0" y="0"/>
-          <a:chExt cx="0" cy="0"/>
-        </a:xfrm>
-      </p:grpSpPr>
-      <p:sp>
-        <p:nvSpPr>
-          <p:cNvPr id="2" name="Title 1">
-            <a:extLst>
-              <a:ext uri="{FF2B5EF4-FFF2-40B4-BE49-F238E27FC236}">
-                <a16:creationId xmlns:a16="http://schemas.microsoft.com/office/drawing/2014/main" id="{44664711-4F0A-4858-A435-AA07CE9FE8B4}"/>
-              </a:ext>
-            </a:extLst>
-          </p:cNvPr>
-          <p:cNvSpPr>
-            <a:spLocks noGrp="1"/>
-          </p:cNvSpPr>
-          <p:nvPr>
-            <p:ph type="title"/>
-          </p:nvPr>
-        </p:nvSpPr>
-        <p:spPr>
-          <a:xfrm>
-            <a:off x="1143001" y="361343"/>
-            <a:ext cx="9905998" cy="924532"/>
-          </a:xfrm>
-        </p:spPr>
-        <p:txBody>
-          <a:bodyPr/>
-          <a:lstStyle/>
-          <a:p>
-            <a:r>
-              <a:rPr lang="en-US" dirty="0">
-                <a:latin typeface="Arial" panose="020B0604020202020204" pitchFamily="34" charset="0"/>
-                <a:cs typeface="Arial" panose="020B0604020202020204" pitchFamily="34" charset="0"/>
-              </a:rPr>
-              <a:t>Test cases</a:t>
-            </a:r>
-          </a:p>
-        </p:txBody>
-      </p:sp>
-      <p:sp>
-        <p:nvSpPr>
-          <p:cNvPr id="3" name="Content Placeholder 2">
-            <a:extLst>
-              <a:ext uri="{FF2B5EF4-FFF2-40B4-BE49-F238E27FC236}">
-                <a16:creationId xmlns:a16="http://schemas.microsoft.com/office/drawing/2014/main" id="{2250339F-B7B0-41AA-8759-A7154FFCC94E}"/>
-              </a:ext>
-            </a:extLst>
-          </p:cNvPr>
-          <p:cNvSpPr>
-            <a:spLocks noGrp="1"/>
-          </p:cNvSpPr>
-          <p:nvPr>
-            <p:ph idx="1"/>
-          </p:nvPr>
-        </p:nvSpPr>
-        <p:spPr>
-          <a:xfrm>
-            <a:off x="1143001" y="1487487"/>
-            <a:ext cx="9905999" cy="3541714"/>
-          </a:xfrm>
-        </p:spPr>
-        <p:txBody>
-          <a:bodyPr/>
-          <a:lstStyle/>
-          <a:p>
-            <a:endParaRPr lang="en-US">
-              <a:latin typeface="Arial" panose="020B0604020202020204" pitchFamily="34" charset="0"/>
-              <a:cs typeface="Arial" panose="020B0604020202020204" pitchFamily="34" charset="0"/>
-            </a:endParaRPr>
-          </a:p>
-        </p:txBody>
-      </p:sp>
-    </p:spTree>
-    <p:extLst>
-      <p:ext uri="{BB962C8B-B14F-4D97-AF65-F5344CB8AC3E}">
-        <p14:creationId xmlns:p14="http://schemas.microsoft.com/office/powerpoint/2010/main" val="2911294904"/>
-      </p:ext>
-    </p:extLst>
-  </p:cSld>
-  <p:clrMapOvr>
-    <a:masterClrMapping/>
-  </p:clrMapOvr>
-</p:sld>
-</file>
-
 <file path=ppt/slides/slide34.xml><?xml version="1.0" encoding="utf-8"?>
 <p:sld xmlns:a="http://schemas.openxmlformats.org/drawingml/2006/main" xmlns:r="http://schemas.openxmlformats.org/officeDocument/2006/relationships" xmlns:p="http://schemas.openxmlformats.org/presentationml/2006/main">
   <p:cSld>
@@ -6290,7 +6311,7 @@
           <p:cNvPr id="2" name="Title 1">
             <a:extLst>
               <a:ext uri="{FF2B5EF4-FFF2-40B4-BE49-F238E27FC236}">
-                <a16:creationId xmlns:a16="http://schemas.microsoft.com/office/drawing/2014/main" id="{4E98BAD5-5412-4078-9038-85B6723E8D22}"/>
+                <a16:creationId xmlns:a16="http://schemas.microsoft.com/office/drawing/2014/main" id="{44664711-4F0A-4858-A435-AA07CE9FE8B4}"/>
               </a:ext>
             </a:extLst>
           </p:cNvPr>
@@ -6303,8 +6324,8 @@
         </p:nvSpPr>
         <p:spPr>
           <a:xfrm>
-            <a:off x="1141413" y="294668"/>
-            <a:ext cx="9905998" cy="1048357"/>
+            <a:off x="1143001" y="361343"/>
+            <a:ext cx="9905998" cy="924532"/>
           </a:xfrm>
         </p:spPr>
         <p:txBody>
@@ -6316,7 +6337,7 @@
                 <a:latin typeface="Arial" panose="020B0604020202020204" pitchFamily="34" charset="0"/>
                 <a:cs typeface="Arial" panose="020B0604020202020204" pitchFamily="34" charset="0"/>
               </a:rPr>
-              <a:t>Future work</a:t>
+              <a:t>Test cases</a:t>
             </a:r>
           </a:p>
         </p:txBody>
@@ -6326,7 +6347,7 @@
           <p:cNvPr id="3" name="Content Placeholder 2">
             <a:extLst>
               <a:ext uri="{FF2B5EF4-FFF2-40B4-BE49-F238E27FC236}">
-                <a16:creationId xmlns:a16="http://schemas.microsoft.com/office/drawing/2014/main" id="{D0034F5F-4075-45F0-B953-6F29F74F2D8C}"/>
+                <a16:creationId xmlns:a16="http://schemas.microsoft.com/office/drawing/2014/main" id="{2250339F-B7B0-41AA-8759-A7154FFCC94E}"/>
               </a:ext>
             </a:extLst>
           </p:cNvPr>
@@ -6339,7 +6360,7 @@
         </p:nvSpPr>
         <p:spPr>
           <a:xfrm>
-            <a:off x="1141413" y="1582737"/>
+            <a:off x="1143001" y="1487487"/>
             <a:ext cx="9905999" cy="3541714"/>
           </a:xfrm>
         </p:spPr>
@@ -6347,7 +6368,7 @@
           <a:bodyPr/>
           <a:lstStyle/>
           <a:p>
-            <a:endParaRPr lang="en-US" dirty="0">
+            <a:endParaRPr lang="en-US">
               <a:latin typeface="Arial" panose="020B0604020202020204" pitchFamily="34" charset="0"/>
               <a:cs typeface="Arial" panose="020B0604020202020204" pitchFamily="34" charset="0"/>
             </a:endParaRPr>
@@ -6357,7 +6378,7 @@
     </p:spTree>
     <p:extLst>
       <p:ext uri="{BB962C8B-B14F-4D97-AF65-F5344CB8AC3E}">
-        <p14:creationId xmlns:p14="http://schemas.microsoft.com/office/powerpoint/2010/main" val="1802389579"/>
+        <p14:creationId xmlns:p14="http://schemas.microsoft.com/office/powerpoint/2010/main" val="2911294904"/>
       </p:ext>
     </p:extLst>
   </p:cSld>
@@ -6389,7 +6410,7 @@
           <p:cNvPr id="2" name="Title 1">
             <a:extLst>
               <a:ext uri="{FF2B5EF4-FFF2-40B4-BE49-F238E27FC236}">
-                <a16:creationId xmlns:a16="http://schemas.microsoft.com/office/drawing/2014/main" id="{06A34261-0AC8-4C03-AB42-9D07A9850B29}"/>
+                <a16:creationId xmlns:a16="http://schemas.microsoft.com/office/drawing/2014/main" id="{4E98BAD5-5412-4078-9038-85B6723E8D22}"/>
               </a:ext>
             </a:extLst>
           </p:cNvPr>
@@ -6402,7 +6423,7 @@
         </p:nvSpPr>
         <p:spPr>
           <a:xfrm>
-            <a:off x="1141413" y="618518"/>
+            <a:off x="1141413" y="294668"/>
             <a:ext cx="9905998" cy="1048357"/>
           </a:xfrm>
         </p:spPr>
@@ -6415,7 +6436,7 @@
                 <a:latin typeface="Arial" panose="020B0604020202020204" pitchFamily="34" charset="0"/>
                 <a:cs typeface="Arial" panose="020B0604020202020204" pitchFamily="34" charset="0"/>
               </a:rPr>
-              <a:t>Limitation </a:t>
+              <a:t>Future work</a:t>
             </a:r>
           </a:p>
         </p:txBody>
@@ -6425,7 +6446,7 @@
           <p:cNvPr id="3" name="Content Placeholder 2">
             <a:extLst>
               <a:ext uri="{FF2B5EF4-FFF2-40B4-BE49-F238E27FC236}">
-                <a16:creationId xmlns:a16="http://schemas.microsoft.com/office/drawing/2014/main" id="{D1BDBC79-AF01-4C08-B034-36571B91E97C}"/>
+                <a16:creationId xmlns:a16="http://schemas.microsoft.com/office/drawing/2014/main" id="{D0034F5F-4075-45F0-B953-6F29F74F2D8C}"/>
               </a:ext>
             </a:extLst>
           </p:cNvPr>
@@ -6438,7 +6459,7 @@
         </p:nvSpPr>
         <p:spPr>
           <a:xfrm>
-            <a:off x="1141413" y="1906587"/>
+            <a:off x="1141413" y="1582737"/>
             <a:ext cx="9905999" cy="3541714"/>
           </a:xfrm>
         </p:spPr>
@@ -6446,7 +6467,7 @@
           <a:bodyPr/>
           <a:lstStyle/>
           <a:p>
-            <a:endParaRPr lang="en-US">
+            <a:endParaRPr lang="en-US" dirty="0">
               <a:latin typeface="Arial" panose="020B0604020202020204" pitchFamily="34" charset="0"/>
               <a:cs typeface="Arial" panose="020B0604020202020204" pitchFamily="34" charset="0"/>
             </a:endParaRPr>
@@ -6456,7 +6477,7 @@
     </p:spTree>
     <p:extLst>
       <p:ext uri="{BB962C8B-B14F-4D97-AF65-F5344CB8AC3E}">
-        <p14:creationId xmlns:p14="http://schemas.microsoft.com/office/powerpoint/2010/main" val="2010395731"/>
+        <p14:creationId xmlns:p14="http://schemas.microsoft.com/office/powerpoint/2010/main" val="1802389579"/>
       </p:ext>
     </p:extLst>
   </p:cSld>
@@ -6488,7 +6509,7 @@
           <p:cNvPr id="2" name="Title 1">
             <a:extLst>
               <a:ext uri="{FF2B5EF4-FFF2-40B4-BE49-F238E27FC236}">
-                <a16:creationId xmlns:a16="http://schemas.microsoft.com/office/drawing/2014/main" id="{E129C55A-1DAF-4427-8186-52710364D7A5}"/>
+                <a16:creationId xmlns:a16="http://schemas.microsoft.com/office/drawing/2014/main" id="{06A34261-0AC8-4C03-AB42-9D07A9850B29}"/>
               </a:ext>
             </a:extLst>
           </p:cNvPr>
@@ -6501,8 +6522,8 @@
         </p:nvSpPr>
         <p:spPr>
           <a:xfrm>
-            <a:off x="1141413" y="418493"/>
-            <a:ext cx="9905998" cy="1067407"/>
+            <a:off x="1141413" y="618518"/>
+            <a:ext cx="9905998" cy="1048357"/>
           </a:xfrm>
         </p:spPr>
         <p:txBody>
@@ -6514,7 +6535,7 @@
                 <a:latin typeface="Arial" panose="020B0604020202020204" pitchFamily="34" charset="0"/>
                 <a:cs typeface="Arial" panose="020B0604020202020204" pitchFamily="34" charset="0"/>
               </a:rPr>
-              <a:t>User manual </a:t>
+              <a:t>Limitation </a:t>
             </a:r>
           </a:p>
         </p:txBody>
@@ -6524,7 +6545,7 @@
           <p:cNvPr id="3" name="Content Placeholder 2">
             <a:extLst>
               <a:ext uri="{FF2B5EF4-FFF2-40B4-BE49-F238E27FC236}">
-                <a16:creationId xmlns:a16="http://schemas.microsoft.com/office/drawing/2014/main" id="{060BDCD0-AD2C-4350-88D0-6DBBDB7B4463}"/>
+                <a16:creationId xmlns:a16="http://schemas.microsoft.com/office/drawing/2014/main" id="{D1BDBC79-AF01-4C08-B034-36571B91E97C}"/>
               </a:ext>
             </a:extLst>
           </p:cNvPr>
@@ -6537,7 +6558,7 @@
         </p:nvSpPr>
         <p:spPr>
           <a:xfrm>
-            <a:off x="1141411" y="1811337"/>
+            <a:off x="1141413" y="1906587"/>
             <a:ext cx="9905999" cy="3541714"/>
           </a:xfrm>
         </p:spPr>
@@ -6545,7 +6566,25 @@
           <a:bodyPr/>
           <a:lstStyle/>
           <a:p>
-            <a:endParaRPr lang="en-US">
+            <a:r>
+              <a:rPr lang="en-US" dirty="0">
+                <a:latin typeface="Arial" panose="020B0604020202020204" pitchFamily="34" charset="0"/>
+                <a:cs typeface="Arial" panose="020B0604020202020204" pitchFamily="34" charset="0"/>
+              </a:rPr>
+              <a:t>Lacks online payment system.</a:t>
+            </a:r>
+          </a:p>
+          <a:p>
+            <a:r>
+              <a:rPr lang="en-US" dirty="0">
+                <a:latin typeface="Arial" panose="020B0604020202020204" pitchFamily="34" charset="0"/>
+                <a:cs typeface="Arial" panose="020B0604020202020204" pitchFamily="34" charset="0"/>
+              </a:rPr>
+              <a:t>Validation while uploading prescribed report by user.</a:t>
+            </a:r>
+          </a:p>
+          <a:p>
+            <a:endParaRPr lang="en-US" dirty="0">
               <a:latin typeface="Arial" panose="020B0604020202020204" pitchFamily="34" charset="0"/>
               <a:cs typeface="Arial" panose="020B0604020202020204" pitchFamily="34" charset="0"/>
             </a:endParaRPr>
@@ -6555,7 +6594,7 @@
     </p:spTree>
     <p:extLst>
       <p:ext uri="{BB962C8B-B14F-4D97-AF65-F5344CB8AC3E}">
-        <p14:creationId xmlns:p14="http://schemas.microsoft.com/office/powerpoint/2010/main" val="3483258742"/>
+        <p14:creationId xmlns:p14="http://schemas.microsoft.com/office/powerpoint/2010/main" val="2010395731"/>
       </p:ext>
     </p:extLst>
   </p:cSld>
@@ -6587,7 +6626,7 @@
           <p:cNvPr id="2" name="Title 1">
             <a:extLst>
               <a:ext uri="{FF2B5EF4-FFF2-40B4-BE49-F238E27FC236}">
-                <a16:creationId xmlns:a16="http://schemas.microsoft.com/office/drawing/2014/main" id="{482F2FAA-C271-4F15-9933-B5EDB3788E62}"/>
+                <a16:creationId xmlns:a16="http://schemas.microsoft.com/office/drawing/2014/main" id="{E129C55A-1DAF-4427-8186-52710364D7A5}"/>
               </a:ext>
             </a:extLst>
           </p:cNvPr>
@@ -6600,8 +6639,8 @@
         </p:nvSpPr>
         <p:spPr>
           <a:xfrm>
-            <a:off x="1141413" y="332768"/>
-            <a:ext cx="9905998" cy="1095982"/>
+            <a:off x="1141413" y="418493"/>
+            <a:ext cx="9905998" cy="1067407"/>
           </a:xfrm>
         </p:spPr>
         <p:txBody>
@@ -6613,7 +6652,7 @@
                 <a:latin typeface="Arial" panose="020B0604020202020204" pitchFamily="34" charset="0"/>
                 <a:cs typeface="Arial" panose="020B0604020202020204" pitchFamily="34" charset="0"/>
               </a:rPr>
-              <a:t>Conclusion</a:t>
+              <a:t>User manual </a:t>
             </a:r>
           </a:p>
         </p:txBody>
@@ -6623,7 +6662,7 @@
           <p:cNvPr id="3" name="Content Placeholder 2">
             <a:extLst>
               <a:ext uri="{FF2B5EF4-FFF2-40B4-BE49-F238E27FC236}">
-                <a16:creationId xmlns:a16="http://schemas.microsoft.com/office/drawing/2014/main" id="{36DBE5C2-1CB7-4BEE-8347-01808FAF2B05}"/>
+                <a16:creationId xmlns:a16="http://schemas.microsoft.com/office/drawing/2014/main" id="{060BDCD0-AD2C-4350-88D0-6DBBDB7B4463}"/>
               </a:ext>
             </a:extLst>
           </p:cNvPr>
@@ -6636,7 +6675,7 @@
         </p:nvSpPr>
         <p:spPr>
           <a:xfrm>
-            <a:off x="1141413" y="1563687"/>
+            <a:off x="1141411" y="1811337"/>
             <a:ext cx="9905999" cy="3541714"/>
           </a:xfrm>
         </p:spPr>
@@ -6644,7 +6683,7 @@
           <a:bodyPr/>
           <a:lstStyle/>
           <a:p>
-            <a:endParaRPr lang="en-US" dirty="0">
+            <a:endParaRPr lang="en-US">
               <a:latin typeface="Arial" panose="020B0604020202020204" pitchFamily="34" charset="0"/>
               <a:cs typeface="Arial" panose="020B0604020202020204" pitchFamily="34" charset="0"/>
             </a:endParaRPr>
@@ -6654,7 +6693,7 @@
     </p:spTree>
     <p:extLst>
       <p:ext uri="{BB962C8B-B14F-4D97-AF65-F5344CB8AC3E}">
-        <p14:creationId xmlns:p14="http://schemas.microsoft.com/office/powerpoint/2010/main" val="2165210028"/>
+        <p14:creationId xmlns:p14="http://schemas.microsoft.com/office/powerpoint/2010/main" val="3483258742"/>
       </p:ext>
     </p:extLst>
   </p:cSld>
@@ -6686,7 +6725,7 @@
           <p:cNvPr id="2" name="Title 1">
             <a:extLst>
               <a:ext uri="{FF2B5EF4-FFF2-40B4-BE49-F238E27FC236}">
-                <a16:creationId xmlns:a16="http://schemas.microsoft.com/office/drawing/2014/main" id="{2BA57A25-E266-4164-8D30-5F03DDB5C165}"/>
+                <a16:creationId xmlns:a16="http://schemas.microsoft.com/office/drawing/2014/main" id="{482F2FAA-C271-4F15-9933-B5EDB3788E62}"/>
               </a:ext>
             </a:extLst>
           </p:cNvPr>
@@ -6699,8 +6738,8 @@
         </p:nvSpPr>
         <p:spPr>
           <a:xfrm>
-            <a:off x="1141413" y="618518"/>
-            <a:ext cx="9905998" cy="1172182"/>
+            <a:off x="1141413" y="332768"/>
+            <a:ext cx="9905998" cy="1095982"/>
           </a:xfrm>
         </p:spPr>
         <p:txBody>
@@ -6712,7 +6751,7 @@
                 <a:latin typeface="Arial" panose="020B0604020202020204" pitchFamily="34" charset="0"/>
                 <a:cs typeface="Arial" panose="020B0604020202020204" pitchFamily="34" charset="0"/>
               </a:rPr>
-              <a:t>References</a:t>
+              <a:t>Conclusion</a:t>
             </a:r>
           </a:p>
         </p:txBody>
@@ -6722,7 +6761,7 @@
           <p:cNvPr id="3" name="Content Placeholder 2">
             <a:extLst>
               <a:ext uri="{FF2B5EF4-FFF2-40B4-BE49-F238E27FC236}">
-                <a16:creationId xmlns:a16="http://schemas.microsoft.com/office/drawing/2014/main" id="{1CFF9084-52EC-4888-B36F-C3CD263F6CA4}"/>
+                <a16:creationId xmlns:a16="http://schemas.microsoft.com/office/drawing/2014/main" id="{36DBE5C2-1CB7-4BEE-8347-01808FAF2B05}"/>
               </a:ext>
             </a:extLst>
           </p:cNvPr>
@@ -6735,106 +6774,25 @@
         </p:nvSpPr>
         <p:spPr>
           <a:xfrm>
-            <a:off x="1141413" y="1982786"/>
-            <a:ext cx="9905999" cy="4398963"/>
-          </a:xfrm>
-        </p:spPr>
-        <p:txBody>
-          <a:bodyPr>
-            <a:normAutofit/>
-          </a:bodyPr>
-          <a:lstStyle/>
-          <a:p>
-            <a:pPr marL="0" indent="0">
-              <a:lnSpc>
-                <a:spcPct val="150000"/>
-              </a:lnSpc>
-              <a:buNone/>
-            </a:pPr>
-            <a:r>
-              <a:rPr lang="en-US" sz="2400" u="sng" dirty="0">
-                <a:latin typeface="Arial" panose="020B0604020202020204" pitchFamily="34" charset="0"/>
-                <a:cs typeface="Arial" panose="020B0604020202020204" pitchFamily="34" charset="0"/>
-                <a:hlinkClick r:id="rId2"/>
-              </a:rPr>
-              <a:t>https://www.interserver.net/tips/kb/mvc-advantages-disadvantages-mvc/</a:t>
-            </a:r>
-            <a:endParaRPr lang="en-US" sz="2400" u="sng" dirty="0">
+            <a:off x="1141413" y="1563687"/>
+            <a:ext cx="9905999" cy="3541714"/>
+          </a:xfrm>
+        </p:spPr>
+        <p:txBody>
+          <a:bodyPr/>
+          <a:lstStyle/>
+          <a:p>
+            <a:endParaRPr lang="en-US" dirty="0">
               <a:latin typeface="Arial" panose="020B0604020202020204" pitchFamily="34" charset="0"/>
               <a:cs typeface="Arial" panose="020B0604020202020204" pitchFamily="34" charset="0"/>
             </a:endParaRPr>
           </a:p>
-          <a:p>
-            <a:pPr marL="0" indent="0">
-              <a:lnSpc>
-                <a:spcPct val="150000"/>
-              </a:lnSpc>
-              <a:buNone/>
-            </a:pPr>
-            <a:r>
-              <a:rPr lang="en-US" sz="2400" u="sng" dirty="0">
-                <a:latin typeface="Arial" panose="020B0604020202020204" pitchFamily="34" charset="0"/>
-                <a:cs typeface="Arial" panose="020B0604020202020204" pitchFamily="34" charset="0"/>
-                <a:hlinkClick r:id="rId3"/>
-              </a:rPr>
-              <a:t>https://www.tutorialspoint.com/sdlc/sdlc_waterfall_model.htm</a:t>
-            </a:r>
-            <a:endParaRPr lang="en-US" sz="2400" u="sng" dirty="0">
-              <a:latin typeface="Arial" panose="020B0604020202020204" pitchFamily="34" charset="0"/>
-              <a:cs typeface="Arial" panose="020B0604020202020204" pitchFamily="34" charset="0"/>
-            </a:endParaRPr>
-          </a:p>
-          <a:p>
-            <a:pPr marL="0" indent="0">
-              <a:lnSpc>
-                <a:spcPct val="150000"/>
-              </a:lnSpc>
-              <a:buNone/>
-            </a:pPr>
-            <a:r>
-              <a:rPr lang="en-US" sz="2400" u="sng" dirty="0">
-                <a:hlinkClick r:id="rId4"/>
-              </a:rPr>
-              <a:t>https://c2sconsultinggroup.com/the-importance-of-configuration-management/</a:t>
-            </a:r>
-            <a:r>
-              <a:rPr lang="en-US" sz="2400" dirty="0"/>
-              <a:t> </a:t>
-            </a:r>
-          </a:p>
-          <a:p>
-            <a:pPr marL="0" indent="0">
-              <a:lnSpc>
-                <a:spcPct val="150000"/>
-              </a:lnSpc>
-              <a:buNone/>
-            </a:pPr>
-            <a:r>
-              <a:rPr lang="en-US" sz="2400" u="sng" dirty="0">
-                <a:hlinkClick r:id="rId5"/>
-              </a:rPr>
-              <a:t>https://www.slideshare.net/HabtamuAsmare/pharmacy-management-system-requirement-analysis-and-elicitaion-document</a:t>
-            </a:r>
-            <a:endParaRPr lang="en-US" sz="2400" u="sng" dirty="0">
-              <a:latin typeface="Arial" panose="020B0604020202020204" pitchFamily="34" charset="0"/>
-              <a:cs typeface="Arial" panose="020B0604020202020204" pitchFamily="34" charset="0"/>
-            </a:endParaRPr>
-          </a:p>
-          <a:p>
-            <a:pPr marL="0" indent="0">
-              <a:buNone/>
-            </a:pPr>
-            <a:endParaRPr lang="en-US" sz="2400" dirty="0">
-              <a:latin typeface="Arial" panose="020B0604020202020204" pitchFamily="34" charset="0"/>
-              <a:cs typeface="Arial" panose="020B0604020202020204" pitchFamily="34" charset="0"/>
-            </a:endParaRPr>
-          </a:p>
         </p:txBody>
       </p:sp>
     </p:spTree>
     <p:extLst>
       <p:ext uri="{BB962C8B-B14F-4D97-AF65-F5344CB8AC3E}">
-        <p14:creationId xmlns:p14="http://schemas.microsoft.com/office/powerpoint/2010/main" val="329500837"/>
+        <p14:creationId xmlns:p14="http://schemas.microsoft.com/office/powerpoint/2010/main" val="2165210028"/>
       </p:ext>
     </p:extLst>
   </p:cSld>
@@ -6866,7 +6824,7 @@
           <p:cNvPr id="2" name="Title 1">
             <a:extLst>
               <a:ext uri="{FF2B5EF4-FFF2-40B4-BE49-F238E27FC236}">
-                <a16:creationId xmlns:a16="http://schemas.microsoft.com/office/drawing/2014/main" id="{A0F5789A-7972-4EF3-815A-6E4CC4566CED}"/>
+                <a16:creationId xmlns:a16="http://schemas.microsoft.com/office/drawing/2014/main" id="{2BA57A25-E266-4164-8D30-5F03DDB5C165}"/>
               </a:ext>
             </a:extLst>
           </p:cNvPr>
@@ -6879,30 +6837,142 @@
         </p:nvSpPr>
         <p:spPr>
           <a:xfrm>
-            <a:off x="3800475" y="2371118"/>
-            <a:ext cx="4943475" cy="1478570"/>
+            <a:off x="1141413" y="618518"/>
+            <a:ext cx="9905998" cy="1172182"/>
+          </a:xfrm>
+        </p:spPr>
+        <p:txBody>
+          <a:bodyPr/>
+          <a:lstStyle/>
+          <a:p>
+            <a:r>
+              <a:rPr lang="en-US" dirty="0">
+                <a:latin typeface="Arial" panose="020B0604020202020204" pitchFamily="34" charset="0"/>
+                <a:cs typeface="Arial" panose="020B0604020202020204" pitchFamily="34" charset="0"/>
+              </a:rPr>
+              <a:t>References</a:t>
+            </a:r>
+          </a:p>
+        </p:txBody>
+      </p:sp>
+      <p:sp>
+        <p:nvSpPr>
+          <p:cNvPr id="3" name="Content Placeholder 2">
+            <a:extLst>
+              <a:ext uri="{FF2B5EF4-FFF2-40B4-BE49-F238E27FC236}">
+                <a16:creationId xmlns:a16="http://schemas.microsoft.com/office/drawing/2014/main" id="{1CFF9084-52EC-4888-B36F-C3CD263F6CA4}"/>
+              </a:ext>
+            </a:extLst>
+          </p:cNvPr>
+          <p:cNvSpPr>
+            <a:spLocks noGrp="1"/>
+          </p:cNvSpPr>
+          <p:nvPr>
+            <p:ph idx="1"/>
+          </p:nvPr>
+        </p:nvSpPr>
+        <p:spPr>
+          <a:xfrm>
+            <a:off x="1141413" y="1982786"/>
+            <a:ext cx="9905999" cy="4398963"/>
           </a:xfrm>
         </p:spPr>
         <p:txBody>
           <a:bodyPr>
-            <a:noAutofit/>
+            <a:normAutofit/>
           </a:bodyPr>
           <a:lstStyle/>
           <a:p>
-            <a:r>
-              <a:rPr lang="en-US" sz="5400" dirty="0">
-                <a:latin typeface="Arial" panose="020B0604020202020204" pitchFamily="34" charset="0"/>
-                <a:cs typeface="Arial" panose="020B0604020202020204" pitchFamily="34" charset="0"/>
-              </a:rPr>
-              <a:t>Any question ?</a:t>
-            </a:r>
+            <a:pPr marL="0" indent="0">
+              <a:lnSpc>
+                <a:spcPct val="150000"/>
+              </a:lnSpc>
+              <a:buNone/>
+            </a:pPr>
+            <a:r>
+              <a:rPr lang="en-US" sz="2400" u="sng" dirty="0">
+                <a:latin typeface="Arial" panose="020B0604020202020204" pitchFamily="34" charset="0"/>
+                <a:cs typeface="Arial" panose="020B0604020202020204" pitchFamily="34" charset="0"/>
+                <a:hlinkClick r:id="rId2"/>
+              </a:rPr>
+              <a:t>https://www.interserver.net/tips/kb/mvc-advantages-disadvantages-mvc/</a:t>
+            </a:r>
+            <a:endParaRPr lang="en-US" sz="2400" u="sng" dirty="0">
+              <a:latin typeface="Arial" panose="020B0604020202020204" pitchFamily="34" charset="0"/>
+              <a:cs typeface="Arial" panose="020B0604020202020204" pitchFamily="34" charset="0"/>
+            </a:endParaRPr>
+          </a:p>
+          <a:p>
+            <a:pPr marL="0" indent="0">
+              <a:lnSpc>
+                <a:spcPct val="150000"/>
+              </a:lnSpc>
+              <a:buNone/>
+            </a:pPr>
+            <a:r>
+              <a:rPr lang="en-US" sz="2400" u="sng" dirty="0">
+                <a:latin typeface="Arial" panose="020B0604020202020204" pitchFamily="34" charset="0"/>
+                <a:cs typeface="Arial" panose="020B0604020202020204" pitchFamily="34" charset="0"/>
+                <a:hlinkClick r:id="rId3"/>
+              </a:rPr>
+              <a:t>https://www.tutorialspoint.com/sdlc/sdlc_waterfall_model.htm</a:t>
+            </a:r>
+            <a:endParaRPr lang="en-US" sz="2400" u="sng" dirty="0">
+              <a:latin typeface="Arial" panose="020B0604020202020204" pitchFamily="34" charset="0"/>
+              <a:cs typeface="Arial" panose="020B0604020202020204" pitchFamily="34" charset="0"/>
+            </a:endParaRPr>
+          </a:p>
+          <a:p>
+            <a:pPr marL="0" indent="0">
+              <a:lnSpc>
+                <a:spcPct val="150000"/>
+              </a:lnSpc>
+              <a:buNone/>
+            </a:pPr>
+            <a:r>
+              <a:rPr lang="en-US" sz="2400" u="sng" dirty="0">
+                <a:hlinkClick r:id="rId4"/>
+              </a:rPr>
+              <a:t>https://c2sconsultinggroup.com/the-importance-of-configuration-management/</a:t>
+            </a:r>
+            <a:r>
+              <a:rPr lang="en-US" sz="2400" dirty="0"/>
+              <a:t> </a:t>
+            </a:r>
+          </a:p>
+          <a:p>
+            <a:pPr marL="0" indent="0">
+              <a:lnSpc>
+                <a:spcPct val="150000"/>
+              </a:lnSpc>
+              <a:buNone/>
+            </a:pPr>
+            <a:r>
+              <a:rPr lang="en-US" sz="2400" u="sng" dirty="0">
+                <a:hlinkClick r:id="rId5"/>
+              </a:rPr>
+              <a:t>https://www.slideshare.net/HabtamuAsmare/pharmacy-management-system-requirement-analysis-and-elicitaion-document</a:t>
+            </a:r>
+            <a:endParaRPr lang="en-US" sz="2400" u="sng" dirty="0">
+              <a:latin typeface="Arial" panose="020B0604020202020204" pitchFamily="34" charset="0"/>
+              <a:cs typeface="Arial" panose="020B0604020202020204" pitchFamily="34" charset="0"/>
+            </a:endParaRPr>
+          </a:p>
+          <a:p>
+            <a:pPr marL="0" indent="0">
+              <a:buNone/>
+            </a:pPr>
+            <a:endParaRPr lang="en-US" sz="2400" dirty="0">
+              <a:latin typeface="Arial" panose="020B0604020202020204" pitchFamily="34" charset="0"/>
+              <a:cs typeface="Arial" panose="020B0604020202020204" pitchFamily="34" charset="0"/>
+            </a:endParaRPr>
           </a:p>
         </p:txBody>
       </p:sp>
     </p:spTree>
     <p:extLst>
       <p:ext uri="{BB962C8B-B14F-4D97-AF65-F5344CB8AC3E}">
-        <p14:creationId xmlns:p14="http://schemas.microsoft.com/office/powerpoint/2010/main" val="1102077726"/>
+        <p14:creationId xmlns:p14="http://schemas.microsoft.com/office/powerpoint/2010/main" val="329500837"/>
       </p:ext>
     </p:extLst>
   </p:cSld>
@@ -7054,6 +7124,74 @@
 </file>
 
 <file path=ppt/slides/slide40.xml><?xml version="1.0" encoding="utf-8"?>
+<p:sld xmlns:a="http://schemas.openxmlformats.org/drawingml/2006/main" xmlns:r="http://schemas.openxmlformats.org/officeDocument/2006/relationships" xmlns:p="http://schemas.openxmlformats.org/presentationml/2006/main">
+  <p:cSld>
+    <p:spTree>
+      <p:nvGrpSpPr>
+        <p:cNvPr id="1" name=""/>
+        <p:cNvGrpSpPr/>
+        <p:nvPr/>
+      </p:nvGrpSpPr>
+      <p:grpSpPr>
+        <a:xfrm>
+          <a:off x="0" y="0"/>
+          <a:ext cx="0" cy="0"/>
+          <a:chOff x="0" y="0"/>
+          <a:chExt cx="0" cy="0"/>
+        </a:xfrm>
+      </p:grpSpPr>
+      <p:sp>
+        <p:nvSpPr>
+          <p:cNvPr id="2" name="Title 1">
+            <a:extLst>
+              <a:ext uri="{FF2B5EF4-FFF2-40B4-BE49-F238E27FC236}">
+                <a16:creationId xmlns:a16="http://schemas.microsoft.com/office/drawing/2014/main" id="{A0F5789A-7972-4EF3-815A-6E4CC4566CED}"/>
+              </a:ext>
+            </a:extLst>
+          </p:cNvPr>
+          <p:cNvSpPr>
+            <a:spLocks noGrp="1"/>
+          </p:cNvSpPr>
+          <p:nvPr>
+            <p:ph type="title"/>
+          </p:nvPr>
+        </p:nvSpPr>
+        <p:spPr>
+          <a:xfrm>
+            <a:off x="3800475" y="2371118"/>
+            <a:ext cx="4943475" cy="1478570"/>
+          </a:xfrm>
+        </p:spPr>
+        <p:txBody>
+          <a:bodyPr>
+            <a:noAutofit/>
+          </a:bodyPr>
+          <a:lstStyle/>
+          <a:p>
+            <a:r>
+              <a:rPr lang="en-US" sz="5400" dirty="0">
+                <a:latin typeface="Arial" panose="020B0604020202020204" pitchFamily="34" charset="0"/>
+                <a:cs typeface="Arial" panose="020B0604020202020204" pitchFamily="34" charset="0"/>
+              </a:rPr>
+              <a:t>Any question ?</a:t>
+            </a:r>
+          </a:p>
+        </p:txBody>
+      </p:sp>
+    </p:spTree>
+    <p:extLst>
+      <p:ext uri="{BB962C8B-B14F-4D97-AF65-F5344CB8AC3E}">
+        <p14:creationId xmlns:p14="http://schemas.microsoft.com/office/powerpoint/2010/main" val="1102077726"/>
+      </p:ext>
+    </p:extLst>
+  </p:cSld>
+  <p:clrMapOvr>
+    <a:masterClrMapping/>
+  </p:clrMapOvr>
+</p:sld>
+</file>
+
+<file path=ppt/slides/slide41.xml><?xml version="1.0" encoding="utf-8"?>
 <p:sld xmlns:a="http://schemas.openxmlformats.org/drawingml/2006/main" xmlns:r="http://schemas.openxmlformats.org/officeDocument/2006/relationships" xmlns:p="http://schemas.openxmlformats.org/presentationml/2006/main">
   <p:cSld>
     <p:spTree>

</xml_diff>